<commit_message>
updating all files to latest version
</commit_message>
<xml_diff>
--- a/Chanco_STA6206_BDA_2019_Henrion_Practical1_2_Solutions.pptx
+++ b/Chanco_STA6206_BDA_2019_Henrion_Practical1_2_Solutions.pptx
@@ -24709,65 +24709,68 @@
                           </m:sSubSup>
                         </m:den>
                       </m:f>
-                      <m:r>
-                        <m:t>(</m:t>
-                      </m:r>
-                      <m:sSup>
+                      <m:d>
+                        <m:dPr>
+                          <m:begChr m:val="("/>
+                          <m:endChr m:val=")"/>
+                          <m:grow/>
+                        </m:dPr>
                         <m:e>
+                          <m:sSup>
+                            <m:e>
+                              <m:r>
+                                <m:t>μ</m:t>
+                              </m:r>
+                            </m:e>
+                            <m:sup>
+                              <m:r>
+                                <m:t>2</m:t>
+                              </m:r>
+                            </m:sup>
+                          </m:sSup>
+                          <m:r>
+                            <m:t>−</m:t>
+                          </m:r>
+                          <m:r>
+                            <m:t>2</m:t>
+                          </m:r>
                           <m:r>
                             <m:t>μ</m:t>
                           </m:r>
+                          <m:sSub>
+                            <m:e>
+                              <m:r>
+                                <m:t>μ</m:t>
+                              </m:r>
+                            </m:e>
+                            <m:sub>
+                              <m:r>
+                                <m:t>0</m:t>
+                              </m:r>
+                            </m:sub>
+                          </m:sSub>
+                          <m:r>
+                            <m:t>+</m:t>
+                          </m:r>
+                          <m:sSubSup>
+                            <m:e>
+                              <m:r>
+                                <m:t>μ</m:t>
+                              </m:r>
+                            </m:e>
+                            <m:sub>
+                              <m:r>
+                                <m:t>o</m:t>
+                              </m:r>
+                            </m:sub>
+                            <m:sup>
+                              <m:r>
+                                <m:t>2</m:t>
+                              </m:r>
+                            </m:sup>
+                          </m:sSubSup>
                         </m:e>
-                        <m:sup>
-                          <m:r>
-                            <m:t>2</m:t>
-                          </m:r>
-                        </m:sup>
-                      </m:sSup>
-                      <m:r>
-                        <m:t>−</m:t>
-                      </m:r>
-                      <m:r>
-                        <m:t>2</m:t>
-                      </m:r>
-                      <m:r>
-                        <m:t>μ</m:t>
-                      </m:r>
-                      <m:sSub>
-                        <m:e>
-                          <m:r>
-                            <m:t>μ</m:t>
-                          </m:r>
-                        </m:e>
-                        <m:sub>
-                          <m:r>
-                            <m:t>0</m:t>
-                          </m:r>
-                        </m:sub>
-                      </m:sSub>
-                      <m:r>
-                        <m:t>+</m:t>
-                      </m:r>
-                      <m:sSubSup>
-                        <m:e>
-                          <m:r>
-                            <m:t>μ</m:t>
-                          </m:r>
-                        </m:e>
-                        <m:sub>
-                          <m:r>
-                            <m:t>o</m:t>
-                          </m:r>
-                        </m:sub>
-                        <m:sup>
-                          <m:r>
-                            <m:t>2</m:t>
-                          </m:r>
-                        </m:sup>
-                      </m:sSubSup>
-                      <m:r>
-                        <m:t>)</m:t>
-                      </m:r>
+                      </m:d>
                       <m:r>
                         <m:t>+</m:t>
                       </m:r>
@@ -24795,33 +24798,20 @@
                           </m:sSup>
                         </m:den>
                       </m:f>
-                      <m:r>
-                        <m:t>(</m:t>
-                      </m:r>
-                      <m:nary>
-                        <m:naryPr>
-                          <m:chr m:val="∑"/>
-                          <m:limLoc m:val="undOvr"/>
-                          <m:subHide m:val="0"/>
-                          <m:supHide m:val="1"/>
-                        </m:naryPr>
-                        <m:sub>
-                          <m:r>
-                            <m:t>i</m:t>
-                          </m:r>
-                        </m:sub>
-                        <m:sup>
-                          <m:r>
-                            <m:t>​</m:t>
-                          </m:r>
-                        </m:sup>
+                      <m:d>
+                        <m:dPr>
+                          <m:begChr m:val="("/>
+                          <m:endChr m:val=")"/>
+                          <m:grow/>
+                        </m:dPr>
                         <m:e>
-                          <m:sSubSup>
-                            <m:e>
-                              <m:r>
-                                <m:t>y</m:t>
-                              </m:r>
-                            </m:e>
+                          <m:nary>
+                            <m:naryPr>
+                              <m:chr m:val="∑"/>
+                              <m:limLoc m:val="undOvr"/>
+                              <m:subHide m:val="0"/>
+                              <m:supHide m:val="1"/>
+                            </m:naryPr>
                             <m:sub>
                               <m:r>
                                 <m:t>i</m:t>
@@ -24829,74 +24819,90 @@
                             </m:sub>
                             <m:sup>
                               <m:r>
-                                <m:t>2</m:t>
+                                <m:t>​</m:t>
                               </m:r>
                             </m:sup>
-                          </m:sSubSup>
-                        </m:e>
-                      </m:nary>
-                      <m:r>
-                        <m:t>−</m:t>
-                      </m:r>
-                      <m:r>
-                        <m:t>2</m:t>
-                      </m:r>
-                      <m:r>
-                        <m:t>μ</m:t>
-                      </m:r>
-                      <m:nary>
-                        <m:naryPr>
-                          <m:chr m:val="∑"/>
-                          <m:limLoc m:val="undOvr"/>
-                          <m:subHide m:val="0"/>
-                          <m:supHide m:val="1"/>
-                        </m:naryPr>
-                        <m:sub>
+                            <m:e>
+                              <m:sSubSup>
+                                <m:e>
+                                  <m:r>
+                                    <m:t>y</m:t>
+                                  </m:r>
+                                </m:e>
+                                <m:sub>
+                                  <m:r>
+                                    <m:t>i</m:t>
+                                  </m:r>
+                                </m:sub>
+                                <m:sup>
+                                  <m:r>
+                                    <m:t>2</m:t>
+                                  </m:r>
+                                </m:sup>
+                              </m:sSubSup>
+                            </m:e>
+                          </m:nary>
                           <m:r>
-                            <m:t>i</m:t>
+                            <m:t>−</m:t>
                           </m:r>
-                        </m:sub>
-                        <m:sup>
                           <m:r>
-                            <m:t>​</m:t>
+                            <m:t>2</m:t>
                           </m:r>
-                        </m:sup>
-                        <m:e>
-                          <m:sSub>
-                            <m:e>
-                              <m:r>
-                                <m:t>y</m:t>
-                              </m:r>
-                            </m:e>
+                          <m:r>
+                            <m:t>μ</m:t>
+                          </m:r>
+                          <m:nary>
+                            <m:naryPr>
+                              <m:chr m:val="∑"/>
+                              <m:limLoc m:val="undOvr"/>
+                              <m:subHide m:val="0"/>
+                              <m:supHide m:val="1"/>
+                            </m:naryPr>
                             <m:sub>
                               <m:r>
                                 <m:t>i</m:t>
                               </m:r>
                             </m:sub>
-                          </m:sSub>
+                            <m:sup>
+                              <m:r>
+                                <m:t>​</m:t>
+                              </m:r>
+                            </m:sup>
+                            <m:e>
+                              <m:sSub>
+                                <m:e>
+                                  <m:r>
+                                    <m:t>y</m:t>
+                                  </m:r>
+                                </m:e>
+                                <m:sub>
+                                  <m:r>
+                                    <m:t>i</m:t>
+                                  </m:r>
+                                </m:sub>
+                              </m:sSub>
+                            </m:e>
+                          </m:nary>
+                          <m:r>
+                            <m:t>+</m:t>
+                          </m:r>
+                          <m:r>
+                            <m:t>n</m:t>
+                          </m:r>
+                          <m:sSup>
+                            <m:e>
+                              <m:r>
+                                <m:t>μ</m:t>
+                              </m:r>
+                            </m:e>
+                            <m:sup>
+                              <m:r>
+                                <m:t>2</m:t>
+                              </m:r>
+                            </m:sup>
+                          </m:sSup>
                         </m:e>
-                      </m:nary>
-                      <m:r>
-                        <m:t>+</m:t>
-                      </m:r>
-                      <m:r>
-                        <m:t>n</m:t>
-                      </m:r>
-                      <m:sSup>
-                        <m:e>
-                          <m:r>
-                            <m:t>μ</m:t>
-                          </m:r>
-                        </m:e>
-                        <m:sup>
-                          <m:r>
-                            <m:t>2</m:t>
-                          </m:r>
-                        </m:sup>
-                      </m:sSup>
-                      <m:r>
-                        <m:t>)</m:t>
-                      </m:r>
+                      </m:d>
                       <m:r>
                         <m:t>=</m:t>
                       </m:r>

</xml_diff>